<commit_message>
updating 01 04 and 05 ppt slides
</commit_message>
<xml_diff>
--- a/01-introduction/resources/slides/IntelligentAgent_01_Introduction_Instructor.pptx
+++ b/01-introduction/resources/slides/IntelligentAgent_01_Introduction_Instructor.pptx
@@ -222,7 +222,7 @@
           <a:p>
             <a:fld id="{DDEAE8FA-D7B2-4534-825C-89895736491D}" type="datetimeFigureOut">
               <a:rPr lang="en-US" smtClean="0"/>
-              <a:t>4/11/2018</a:t>
+              <a:t>10/10/2018</a:t>
             </a:fld>
             <a:endParaRPr lang="en-US"/>
           </a:p>
@@ -669,7 +669,7 @@
           <a:p>
             <a:fld id="{5A70A388-5CB4-42F2-85B9-1AE1F63398FA}" type="datetime8">
               <a:rPr lang="en-US" smtClean="0"/>
-              <a:t>4/11/2018 7:35 AM</a:t>
+              <a:t>10/10/2018 9:03 AM</a:t>
             </a:fld>
             <a:endParaRPr lang="en-US"/>
           </a:p>
@@ -950,7 +950,7 @@
           <a:p>
             <a:fld id="{5A70A388-5CB4-42F2-85B9-1AE1F63398FA}" type="datetime8">
               <a:rPr lang="en-US" smtClean="0"/>
-              <a:t>4/11/2018 8:07 AM</a:t>
+              <a:t>10/10/2018 9:05 AM</a:t>
             </a:fld>
             <a:endParaRPr lang="en-US"/>
           </a:p>
@@ -1115,7 +1115,7 @@
           <a:p>
             <a:fld id="{5A70A388-5CB4-42F2-85B9-1AE1F63398FA}" type="datetime8">
               <a:rPr lang="en-US" smtClean="0"/>
-              <a:t>4/11/2018 8:11 AM</a:t>
+              <a:t>10/10/2018 9:03 AM</a:t>
             </a:fld>
             <a:endParaRPr lang="en-US"/>
           </a:p>
@@ -1298,7 +1298,7 @@
                   <a:prstClr val="black"/>
                 </a:solidFill>
               </a:rPr>
-              <a:t>4/11/2018 7:35 AM</a:t>
+              <a:t>10/10/2018 9:03 AM</a:t>
             </a:fld>
             <a:endParaRPr lang="en-US">
               <a:solidFill>
@@ -26855,14 +26855,14 @@
           <p:nvPr>
             <p:extLst>
               <p:ext uri="{D42A27DB-BD31-4B8C-83A1-F6EECF244321}">
-                <p14:modId xmlns:p14="http://schemas.microsoft.com/office/powerpoint/2010/main" val="707562741"/>
+                <p14:modId xmlns:p14="http://schemas.microsoft.com/office/powerpoint/2010/main" val="1937545678"/>
               </p:ext>
             </p:extLst>
           </p:nvPr>
         </p:nvGraphicFramePr>
         <p:xfrm>
-          <a:off x="3078212" y="960169"/>
-          <a:ext cx="8297710" cy="5608320"/>
+          <a:off x="3131374" y="350569"/>
+          <a:ext cx="8297710" cy="6217920"/>
         </p:xfrm>
         <a:graphic>
           <a:graphicData uri="http://schemas.openxmlformats.org/drawingml/2006/table">
@@ -26927,7 +26927,7 @@
                     <a:p>
                       <a:r>
                         <a:rPr lang="en-US" sz="1700" b="0" dirty="0"/>
-                        <a:t>9:00-9:30AM</a:t>
+                        <a:t>9:00-9:20AM</a:t>
                       </a:r>
                     </a:p>
                   </a:txBody>
@@ -26960,6 +26960,39 @@
                     <a:p>
                       <a:r>
                         <a:rPr lang="en-US" sz="1700" b="0" dirty="0"/>
+                        <a:t>9:20-9:30AM</a:t>
+                      </a:r>
+                    </a:p>
+                  </a:txBody>
+                  <a:tcPr/>
+                </a:tc>
+                <a:tc>
+                  <a:txBody>
+                    <a:bodyPr/>
+                    <a:lstStyle/>
+                    <a:p>
+                      <a:r>
+                        <a:rPr lang="en-US" sz="1700" b="0" dirty="0"/>
+                        <a:t>AI Ethics</a:t>
+                      </a:r>
+                    </a:p>
+                  </a:txBody>
+                  <a:tcPr/>
+                </a:tc>
+                <a:extLst>
+                  <a:ext uri="{0D108BD9-81ED-4DB2-BD59-A6C34878D82A}">
+                    <a16:rowId xmlns:a16="http://schemas.microsoft.com/office/drawing/2014/main" val="490189930"/>
+                  </a:ext>
+                </a:extLst>
+              </a:tr>
+              <a:tr h="348717">
+                <a:tc>
+                  <a:txBody>
+                    <a:bodyPr/>
+                    <a:lstStyle/>
+                    <a:p>
+                      <a:r>
+                        <a:rPr lang="en-US" sz="1700" b="0" dirty="0"/>
                         <a:t>9:30-10:00AM</a:t>
                       </a:r>
                     </a:p>
@@ -26981,7 +27014,7 @@
                 </a:tc>
                 <a:extLst>
                   <a:ext uri="{0D108BD9-81ED-4DB2-BD59-A6C34878D82A}">
-                    <a16:rowId xmlns:a16="http://schemas.microsoft.com/office/drawing/2014/main" val="1466494906"/>
+                    <a16:rowId xmlns:a16="http://schemas.microsoft.com/office/drawing/2014/main" val="558154135"/>
                   </a:ext>
                 </a:extLst>
               </a:tr>
@@ -27006,7 +27039,7 @@
                     <a:p>
                       <a:r>
                         <a:rPr lang="en-US" sz="1700" b="0" dirty="0"/>
-                        <a:t>2.2: Activity - Bot Design</a:t>
+                        <a:t>2.2: Lab (Discovery, Envisioning) – Designing Bots</a:t>
                       </a:r>
                     </a:p>
                   </a:txBody>
@@ -27014,7 +27047,7 @@
                 </a:tc>
                 <a:extLst>
                   <a:ext uri="{0D108BD9-81ED-4DB2-BD59-A6C34878D82A}">
-                    <a16:rowId xmlns:a16="http://schemas.microsoft.com/office/drawing/2014/main" val="3517001071"/>
+                    <a16:rowId xmlns:a16="http://schemas.microsoft.com/office/drawing/2014/main" val="4098435782"/>
                   </a:ext>
                 </a:extLst>
               </a:tr>
@@ -27047,7 +27080,7 @@
                 </a:tc>
                 <a:extLst>
                   <a:ext uri="{0D108BD9-81ED-4DB2-BD59-A6C34878D82A}">
-                    <a16:rowId xmlns:a16="http://schemas.microsoft.com/office/drawing/2014/main" val="2751380479"/>
+                    <a16:rowId xmlns:a16="http://schemas.microsoft.com/office/drawing/2014/main" val="2290976073"/>
                   </a:ext>
                 </a:extLst>
               </a:tr>
@@ -27080,7 +27113,7 @@
                 </a:tc>
                 <a:extLst>
                   <a:ext uri="{0D108BD9-81ED-4DB2-BD59-A6C34878D82A}">
-                    <a16:rowId xmlns:a16="http://schemas.microsoft.com/office/drawing/2014/main" val="2522067647"/>
+                    <a16:rowId xmlns:a16="http://schemas.microsoft.com/office/drawing/2014/main" val="3015339569"/>
                   </a:ext>
                 </a:extLst>
               </a:tr>
@@ -27105,7 +27138,7 @@
                     <a:p>
                       <a:r>
                         <a:rPr lang="en-US" sz="1700" b="0" dirty="0"/>
-                        <a:t>3.2: Activity - LUIS Design</a:t>
+                        <a:t>3.2: Lab (ADS/Wireframe) – Designing LUIS</a:t>
                       </a:r>
                     </a:p>
                   </a:txBody>
@@ -27113,7 +27146,7 @@
                 </a:tc>
                 <a:extLst>
                   <a:ext uri="{0D108BD9-81ED-4DB2-BD59-A6C34878D82A}">
-                    <a16:rowId xmlns:a16="http://schemas.microsoft.com/office/drawing/2014/main" val="1384926224"/>
+                    <a16:rowId xmlns:a16="http://schemas.microsoft.com/office/drawing/2014/main" val="3068334104"/>
                   </a:ext>
                 </a:extLst>
               </a:tr>
@@ -27146,7 +27179,7 @@
                 </a:tc>
                 <a:extLst>
                   <a:ext uri="{0D108BD9-81ED-4DB2-BD59-A6C34878D82A}">
-                    <a16:rowId xmlns:a16="http://schemas.microsoft.com/office/drawing/2014/main" val="1213167525"/>
+                    <a16:rowId xmlns:a16="http://schemas.microsoft.com/office/drawing/2014/main" val="963074187"/>
                   </a:ext>
                 </a:extLst>
               </a:tr>
@@ -27179,7 +27212,7 @@
                 </a:tc>
                 <a:extLst>
                   <a:ext uri="{0D108BD9-81ED-4DB2-BD59-A6C34878D82A}">
-                    <a16:rowId xmlns:a16="http://schemas.microsoft.com/office/drawing/2014/main" val="1742894033"/>
+                    <a16:rowId xmlns:a16="http://schemas.microsoft.com/office/drawing/2014/main" val="2017874801"/>
                   </a:ext>
                 </a:extLst>
               </a:tr>
@@ -27204,7 +27237,7 @@
                     <a:p>
                       <a:r>
                         <a:rPr lang="en-US" sz="1700" b="0" dirty="0"/>
-                        <a:t>4.2: Activity - Architectures</a:t>
+                        <a:t>4.2: Lab (POC) – Initial Architecture</a:t>
                       </a:r>
                     </a:p>
                   </a:txBody>
@@ -27212,7 +27245,7 @@
                 </a:tc>
                 <a:extLst>
                   <a:ext uri="{0D108BD9-81ED-4DB2-BD59-A6C34878D82A}">
-                    <a16:rowId xmlns:a16="http://schemas.microsoft.com/office/drawing/2014/main" val="4086413417"/>
+                    <a16:rowId xmlns:a16="http://schemas.microsoft.com/office/drawing/2014/main" val="1784887889"/>
                   </a:ext>
                 </a:extLst>
               </a:tr>
@@ -27262,7 +27295,7 @@
                 </a:tc>
                 <a:extLst>
                   <a:ext uri="{0D108BD9-81ED-4DB2-BD59-A6C34878D82A}">
-                    <a16:rowId xmlns:a16="http://schemas.microsoft.com/office/drawing/2014/main" val="721002206"/>
+                    <a16:rowId xmlns:a16="http://schemas.microsoft.com/office/drawing/2014/main" val="1275664246"/>
                   </a:ext>
                 </a:extLst>
               </a:tr>
@@ -27295,7 +27328,7 @@
                 </a:tc>
                 <a:extLst>
                   <a:ext uri="{0D108BD9-81ED-4DB2-BD59-A6C34878D82A}">
-                    <a16:rowId xmlns:a16="http://schemas.microsoft.com/office/drawing/2014/main" val="4062772367"/>
+                    <a16:rowId xmlns:a16="http://schemas.microsoft.com/office/drawing/2014/main" val="3761600506"/>
                   </a:ext>
                 </a:extLst>
               </a:tr>
@@ -27337,7 +27370,7 @@
                       </a:pPr>
                       <a:r>
                         <a:rPr lang="en-US" sz="1700" b="0" dirty="0"/>
-                        <a:t>5.2: Activity - Cognitive Services</a:t>
+                        <a:t>5.2: Lab (Handoff) – Cognitive Services</a:t>
                       </a:r>
                     </a:p>
                   </a:txBody>
@@ -27345,7 +27378,7 @@
                 </a:tc>
                 <a:extLst>
                   <a:ext uri="{0D108BD9-81ED-4DB2-BD59-A6C34878D82A}">
-                    <a16:rowId xmlns:a16="http://schemas.microsoft.com/office/drawing/2014/main" val="2883530341"/>
+                    <a16:rowId xmlns:a16="http://schemas.microsoft.com/office/drawing/2014/main" val="2850855381"/>
                   </a:ext>
                 </a:extLst>
               </a:tr>
@@ -27395,7 +27428,7 @@
                 </a:tc>
                 <a:extLst>
                   <a:ext uri="{0D108BD9-81ED-4DB2-BD59-A6C34878D82A}">
-                    <a16:rowId xmlns:a16="http://schemas.microsoft.com/office/drawing/2014/main" val="2349164972"/>
+                    <a16:rowId xmlns:a16="http://schemas.microsoft.com/office/drawing/2014/main" val="2225690814"/>
                   </a:ext>
                 </a:extLst>
               </a:tr>
@@ -27420,7 +27453,7 @@
                     <a:p>
                       <a:r>
                         <a:rPr lang="en-US" sz="1700" b="0" dirty="0"/>
-                        <a:t>6.1: Final Case</a:t>
+                        <a:t>6.1: Capstone Project (Discovery, Envisioning, ADS, POC, Implementation, Handoff and Follow-up)</a:t>
                       </a:r>
                     </a:p>
                   </a:txBody>
@@ -27428,7 +27461,7 @@
                 </a:tc>
                 <a:extLst>
                   <a:ext uri="{0D108BD9-81ED-4DB2-BD59-A6C34878D82A}">
-                    <a16:rowId xmlns:a16="http://schemas.microsoft.com/office/drawing/2014/main" val="1613249668"/>
+                    <a16:rowId xmlns:a16="http://schemas.microsoft.com/office/drawing/2014/main" val="2721745584"/>
                   </a:ext>
                 </a:extLst>
               </a:tr>
@@ -27461,7 +27494,7 @@
                 </a:tc>
                 <a:extLst>
                   <a:ext uri="{0D108BD9-81ED-4DB2-BD59-A6C34878D82A}">
-                    <a16:rowId xmlns:a16="http://schemas.microsoft.com/office/drawing/2014/main" val="379251269"/>
+                    <a16:rowId xmlns:a16="http://schemas.microsoft.com/office/drawing/2014/main" val="3113223840"/>
                   </a:ext>
                 </a:extLst>
               </a:tr>
@@ -28851,31 +28884,6 @@
 </file>
 
 <file path=customXml/item1.xml><?xml version="1.0" encoding="utf-8"?>
-<p:properties xmlns:p="http://schemas.microsoft.com/office/2006/metadata/properties" xmlns:xsi="http://www.w3.org/2001/XMLSchema-instance" xmlns:pc="http://schemas.microsoft.com/office/infopath/2007/PartnerControls">
-  <documentManagement>
-    <LastSharedByUser xmlns="8f159844-3118-4b08-9ac0-0a51e3431bb6">v-karfis@microsoft.com</LastSharedByUser>
-    <SharedWithUsers xmlns="8f159844-3118-4b08-9ac0-0a51e3431bb6">
-      <UserInfo>
-        <DisplayName>Natalie Nurock</DisplayName>
-        <AccountId>85</AccountId>
-        <AccountType/>
-      </UserInfo>
-    </SharedWithUsers>
-    <LastSharedByTime xmlns="8f159844-3118-4b08-9ac0-0a51e3431bb6">2018-03-14T05:42:29+00:00</LastSharedByTime>
-  </documentManagement>
-</p:properties>
-</file>
-
-<file path=customXml/item2.xml><?xml version="1.0" encoding="utf-8"?>
-<?mso-contentType ?>
-<FormTemplates xmlns="http://schemas.microsoft.com/sharepoint/v3/contenttype/forms">
-  <Display>DocumentLibraryForm</Display>
-  <Edit>DocumentLibraryForm</Edit>
-  <New>DocumentLibraryForm</New>
-</FormTemplates>
-</file>
-
-<file path=customXml/item3.xml><?xml version="1.0" encoding="utf-8"?>
 <ct:contentTypeSchema xmlns:ct="http://schemas.microsoft.com/office/2006/metadata/contentType" xmlns:ma="http://schemas.microsoft.com/office/2006/metadata/properties/metaAttributes" ct:_="" ma:_="" ma:contentTypeName="Document" ma:contentTypeID="0x010100ED93766AA3535D4C9AB033C0324D3CD7" ma:contentTypeVersion="6" ma:contentTypeDescription="Create a new document." ma:contentTypeScope="" ma:versionID="710d354100089abd2572cae88cea3a2b">
   <xsd:schema xmlns:xsd="http://www.w3.org/2001/XMLSchema" xmlns:xs="http://www.w3.org/2001/XMLSchema" xmlns:p="http://schemas.microsoft.com/office/2006/metadata/properties" xmlns:ns2="87bad0cd-9f5f-4471-94ca-f7c37ef15840" xmlns:ns3="8f159844-3118-4b08-9ac0-0a51e3431bb6" targetNamespace="http://schemas.microsoft.com/office/2006/metadata/properties" ma:root="true" ma:fieldsID="70ea667c588725e6207a5fd18235c984" ns2:_="" ns3:_="">
     <xsd:import namespace="87bad0cd-9f5f-4471-94ca-f7c37ef15840"/>
@@ -29052,32 +29060,32 @@
 </ct:contentTypeSchema>
 </file>
 
-<file path=customXml/itemProps1.xml><?xml version="1.0" encoding="utf-8"?>
-<ds:datastoreItem xmlns:ds="http://schemas.openxmlformats.org/officeDocument/2006/customXml" ds:itemID="{1E91DBAA-73B1-46DE-A02B-B400BCCAEA24}">
-  <ds:schemaRefs>
-    <ds:schemaRef ds:uri="http://schemas.microsoft.com/office/2006/documentManagement/types"/>
-    <ds:schemaRef ds:uri="8f159844-3118-4b08-9ac0-0a51e3431bb6"/>
-    <ds:schemaRef ds:uri="http://purl.org/dc/elements/1.1/"/>
-    <ds:schemaRef ds:uri="http://schemas.openxmlformats.org/package/2006/metadata/core-properties"/>
-    <ds:schemaRef ds:uri="87bad0cd-9f5f-4471-94ca-f7c37ef15840"/>
-    <ds:schemaRef ds:uri="http://schemas.microsoft.com/office/infopath/2007/PartnerControls"/>
-    <ds:schemaRef ds:uri="http://purl.org/dc/terms/"/>
-    <ds:schemaRef ds:uri="http://schemas.microsoft.com/office/2006/metadata/properties"/>
-    <ds:schemaRef ds:uri="http://www.w3.org/XML/1998/namespace"/>
-    <ds:schemaRef ds:uri="http://purl.org/dc/dcmitype/"/>
-  </ds:schemaRefs>
-</ds:datastoreItem>
+<file path=customXml/item2.xml><?xml version="1.0" encoding="utf-8"?>
+<?mso-contentType ?>
+<FormTemplates xmlns="http://schemas.microsoft.com/sharepoint/v3/contenttype/forms">
+  <Display>DocumentLibraryForm</Display>
+  <Edit>DocumentLibraryForm</Edit>
+  <New>DocumentLibraryForm</New>
+</FormTemplates>
 </file>
 
-<file path=customXml/itemProps2.xml><?xml version="1.0" encoding="utf-8"?>
-<ds:datastoreItem xmlns:ds="http://schemas.openxmlformats.org/officeDocument/2006/customXml" ds:itemID="{81018208-8004-4CED-BF44-ED368E32B811}">
-  <ds:schemaRefs>
-    <ds:schemaRef ds:uri="http://schemas.microsoft.com/sharepoint/v3/contenttype/forms"/>
-  </ds:schemaRefs>
-</ds:datastoreItem>
+<file path=customXml/item3.xml><?xml version="1.0" encoding="utf-8"?>
+<p:properties xmlns:p="http://schemas.microsoft.com/office/2006/metadata/properties" xmlns:xsi="http://www.w3.org/2001/XMLSchema-instance" xmlns:pc="http://schemas.microsoft.com/office/infopath/2007/PartnerControls">
+  <documentManagement>
+    <LastSharedByUser xmlns="8f159844-3118-4b08-9ac0-0a51e3431bb6">v-karfis@microsoft.com</LastSharedByUser>
+    <SharedWithUsers xmlns="8f159844-3118-4b08-9ac0-0a51e3431bb6">
+      <UserInfo>
+        <DisplayName>Natalie Nurock</DisplayName>
+        <AccountId>85</AccountId>
+        <AccountType/>
+      </UserInfo>
+    </SharedWithUsers>
+    <LastSharedByTime xmlns="8f159844-3118-4b08-9ac0-0a51e3431bb6">2018-03-14T05:42:29+00:00</LastSharedByTime>
+  </documentManagement>
+</p:properties>
 </file>
 
-<file path=customXml/itemProps3.xml><?xml version="1.0" encoding="utf-8"?>
+<file path=customXml/itemProps1.xml><?xml version="1.0" encoding="utf-8"?>
 <ds:datastoreItem xmlns:ds="http://schemas.openxmlformats.org/officeDocument/2006/customXml" ds:itemID="{3C55D2E5-22B4-4502-8B75-3251A5BBB67B}">
   <ds:schemaRefs>
     <ds:schemaRef ds:uri="http://schemas.microsoft.com/office/2006/metadata/contentType"/>
@@ -29094,4 +29102,29 @@
     <ds:schemaRef ds:uri="http://schemas.microsoft.com/internal/obd"/>
   </ds:schemaRefs>
 </ds:datastoreItem>
+</file>
+
+<file path=customXml/itemProps2.xml><?xml version="1.0" encoding="utf-8"?>
+<ds:datastoreItem xmlns:ds="http://schemas.openxmlformats.org/officeDocument/2006/customXml" ds:itemID="{81018208-8004-4CED-BF44-ED368E32B811}">
+  <ds:schemaRefs>
+    <ds:schemaRef ds:uri="http://schemas.microsoft.com/sharepoint/v3/contenttype/forms"/>
+  </ds:schemaRefs>
+</ds:datastoreItem>
+</file>
+
+<file path=customXml/itemProps3.xml><?xml version="1.0" encoding="utf-8"?>
+<ds:datastoreItem xmlns:ds="http://schemas.openxmlformats.org/officeDocument/2006/customXml" ds:itemID="{1E91DBAA-73B1-46DE-A02B-B400BCCAEA24}">
+  <ds:schemaRefs>
+    <ds:schemaRef ds:uri="http://schemas.microsoft.com/office/2006/documentManagement/types"/>
+    <ds:schemaRef ds:uri="8f159844-3118-4b08-9ac0-0a51e3431bb6"/>
+    <ds:schemaRef ds:uri="http://purl.org/dc/elements/1.1/"/>
+    <ds:schemaRef ds:uri="http://schemas.openxmlformats.org/package/2006/metadata/core-properties"/>
+    <ds:schemaRef ds:uri="87bad0cd-9f5f-4471-94ca-f7c37ef15840"/>
+    <ds:schemaRef ds:uri="http://schemas.microsoft.com/office/infopath/2007/PartnerControls"/>
+    <ds:schemaRef ds:uri="http://purl.org/dc/terms/"/>
+    <ds:schemaRef ds:uri="http://schemas.microsoft.com/office/2006/metadata/properties"/>
+    <ds:schemaRef ds:uri="http://www.w3.org/XML/1998/namespace"/>
+    <ds:schemaRef ds:uri="http://purl.org/dc/dcmitype/"/>
+  </ds:schemaRefs>
+</ds:datastoreItem>
 </file>
</xml_diff>